<commit_message>
minor changes to final presentation
</commit_message>
<xml_diff>
--- a/bdpt_and_mis_with_ppm_final.pptx
+++ b/bdpt_and_mis_with_ppm_final.pptx
@@ -114,6 +114,11 @@
       </a:defRPr>
     </a:lvl9pPr>
   </p:defaultTextStyle>
+  <p:extLst>
+    <p:ext uri="{EFAFB233-063F-42B5-8137-9DF3F51BA10A}">
+      <p15:sldGuideLst xmlns:p15="http://schemas.microsoft.com/office/powerpoint/2012/main"/>
+    </p:ext>
+  </p:extLst>
 </p:presentation>
 </file>
 
@@ -307,7 +312,7 @@
           <a:p>
             <a:fld id="{4AAD347D-5ACD-4C99-B74B-A9C85AD731AF}" type="datetimeFigureOut">
               <a:rPr lang="en-US" dirty="0"/>
-              <a:t>5/2/2017</a:t>
+              <a:t>5/3/2017</a:t>
             </a:fld>
             <a:endParaRPr lang="en-US" dirty="0"/>
           </a:p>
@@ -577,7 +582,7 @@
           <a:p>
             <a:fld id="{4509A250-FF31-4206-8172-F9D3106AACB1}" type="datetimeFigureOut">
               <a:rPr lang="en-US" dirty="0"/>
-              <a:t>5/2/2017</a:t>
+              <a:t>5/3/2017</a:t>
             </a:fld>
             <a:endParaRPr lang="en-US" dirty="0"/>
           </a:p>
@@ -766,7 +771,7 @@
           <a:p>
             <a:fld id="{4509A250-FF31-4206-8172-F9D3106AACB1}" type="datetimeFigureOut">
               <a:rPr lang="en-US" dirty="0"/>
-              <a:t>5/2/2017</a:t>
+              <a:t>5/3/2017</a:t>
             </a:fld>
             <a:endParaRPr lang="en-US" dirty="0"/>
           </a:p>
@@ -1034,7 +1039,7 @@
           <a:p>
             <a:fld id="{4509A250-FF31-4206-8172-F9D3106AACB1}" type="datetimeFigureOut">
               <a:rPr lang="en-US" dirty="0"/>
-              <a:t>5/2/2017</a:t>
+              <a:t>5/3/2017</a:t>
             </a:fld>
             <a:endParaRPr lang="en-US" dirty="0"/>
           </a:p>
@@ -1370,7 +1375,7 @@
           <a:p>
             <a:fld id="{4509A250-FF31-4206-8172-F9D3106AACB1}" type="datetimeFigureOut">
               <a:rPr lang="en-US" dirty="0"/>
-              <a:t>5/2/2017</a:t>
+              <a:t>5/3/2017</a:t>
             </a:fld>
             <a:endParaRPr lang="en-US" dirty="0"/>
           </a:p>
@@ -1988,7 +1993,7 @@
           <a:p>
             <a:fld id="{4509A250-FF31-4206-8172-F9D3106AACB1}" type="datetimeFigureOut">
               <a:rPr lang="en-US" dirty="0"/>
-              <a:t>5/2/2017</a:t>
+              <a:t>5/3/2017</a:t>
             </a:fld>
             <a:endParaRPr lang="en-US" dirty="0"/>
           </a:p>
@@ -2843,7 +2848,7 @@
           <a:p>
             <a:fld id="{4509A250-FF31-4206-8172-F9D3106AACB1}" type="datetimeFigureOut">
               <a:rPr lang="en-US" dirty="0"/>
-              <a:t>5/2/2017</a:t>
+              <a:t>5/3/2017</a:t>
             </a:fld>
             <a:endParaRPr lang="en-US" dirty="0"/>
           </a:p>
@@ -3008,7 +3013,7 @@
           <a:p>
             <a:fld id="{4509A250-FF31-4206-8172-F9D3106AACB1}" type="datetimeFigureOut">
               <a:rPr lang="en-US" dirty="0"/>
-              <a:t>5/2/2017</a:t>
+              <a:t>5/3/2017</a:t>
             </a:fld>
             <a:endParaRPr lang="en-US" dirty="0"/>
           </a:p>
@@ -3183,7 +3188,7 @@
           <a:p>
             <a:fld id="{4509A250-FF31-4206-8172-F9D3106AACB1}" type="datetimeFigureOut">
               <a:rPr lang="en-US" dirty="0"/>
-              <a:t>5/2/2017</a:t>
+              <a:t>5/3/2017</a:t>
             </a:fld>
             <a:endParaRPr lang="en-US" dirty="0"/>
           </a:p>
@@ -3348,7 +3353,7 @@
           <a:p>
             <a:fld id="{4509A250-FF31-4206-8172-F9D3106AACB1}" type="datetimeFigureOut">
               <a:rPr lang="en-US" dirty="0"/>
-              <a:t>5/2/2017</a:t>
+              <a:t>5/3/2017</a:t>
             </a:fld>
             <a:endParaRPr lang="en-US" dirty="0"/>
           </a:p>
@@ -3590,7 +3595,7 @@
           <a:p>
             <a:fld id="{9796027F-7875-4030-9381-8BD8C4F21935}" type="datetimeFigureOut">
               <a:rPr lang="en-US" dirty="0"/>
-              <a:t>5/2/2017</a:t>
+              <a:t>5/3/2017</a:t>
             </a:fld>
             <a:endParaRPr lang="en-US" dirty="0"/>
           </a:p>
@@ -3877,7 +3882,7 @@
           <a:p>
             <a:fld id="{9796027F-7875-4030-9381-8BD8C4F21935}" type="datetimeFigureOut">
               <a:rPr lang="en-US" dirty="0"/>
-              <a:t>5/2/2017</a:t>
+              <a:t>5/3/2017</a:t>
             </a:fld>
             <a:endParaRPr lang="en-US" dirty="0"/>
           </a:p>
@@ -4316,7 +4321,7 @@
           <a:p>
             <a:fld id="{9796027F-7875-4030-9381-8BD8C4F21935}" type="datetimeFigureOut">
               <a:rPr lang="en-US" dirty="0"/>
-              <a:t>5/2/2017</a:t>
+              <a:t>5/3/2017</a:t>
             </a:fld>
             <a:endParaRPr lang="en-US" dirty="0"/>
           </a:p>
@@ -4429,7 +4434,7 @@
           <a:p>
             <a:fld id="{4509A250-FF31-4206-8172-F9D3106AACB1}" type="datetimeFigureOut">
               <a:rPr lang="en-US" dirty="0"/>
-              <a:t>5/2/2017</a:t>
+              <a:t>5/3/2017</a:t>
             </a:fld>
             <a:endParaRPr lang="en-US" dirty="0"/>
           </a:p>
@@ -4519,7 +4524,7 @@
           <a:p>
             <a:fld id="{4509A250-FF31-4206-8172-F9D3106AACB1}" type="datetimeFigureOut">
               <a:rPr lang="en-US" dirty="0"/>
-              <a:t>5/2/2017</a:t>
+              <a:t>5/3/2017</a:t>
             </a:fld>
             <a:endParaRPr lang="en-US" dirty="0"/>
           </a:p>
@@ -4793,7 +4798,7 @@
           <a:p>
             <a:fld id="{4509A250-FF31-4206-8172-F9D3106AACB1}" type="datetimeFigureOut">
               <a:rPr lang="en-US" dirty="0"/>
-              <a:t>5/2/2017</a:t>
+              <a:t>5/3/2017</a:t>
             </a:fld>
             <a:endParaRPr lang="en-US" dirty="0"/>
           </a:p>
@@ -5063,7 +5068,7 @@
           <a:p>
             <a:fld id="{4509A250-FF31-4206-8172-F9D3106AACB1}" type="datetimeFigureOut">
               <a:rPr lang="en-US" dirty="0"/>
-              <a:t>5/2/2017</a:t>
+              <a:t>5/3/2017</a:t>
             </a:fld>
             <a:endParaRPr lang="en-US" dirty="0"/>
           </a:p>
@@ -5487,7 +5492,7 @@
           <a:p>
             <a:fld id="{4AAD347D-5ACD-4C99-B74B-A9C85AD731AF}" type="datetimeFigureOut">
               <a:rPr lang="en-US" dirty="0"/>
-              <a:t>5/2/2017</a:t>
+              <a:t>5/3/2017</a:t>
             </a:fld>
             <a:endParaRPr lang="en-US" dirty="0"/>
           </a:p>
@@ -6583,738 +6588,163 @@
           </a:p>
         </p:txBody>
       </p:sp>
-      <mc:AlternateContent xmlns:mc="http://schemas.openxmlformats.org/markup-compatibility/2006">
-        <mc:Choice xmlns:a14="http://schemas.microsoft.com/office/drawing/2010/main" Requires="a14">
-          <p:sp>
-            <p:nvSpPr>
-              <p:cNvPr id="5" name="Content Placeholder 4"/>
-              <p:cNvSpPr>
-                <a:spLocks noGrp="1"/>
-              </p:cNvSpPr>
-              <p:nvPr>
-                <p:ph idx="1"/>
-              </p:nvPr>
-            </p:nvSpPr>
-            <p:spPr/>
-            <p:txBody>
-              <a:bodyPr/>
-              <a:lstStyle/>
-              <a:p>
-                <a:r>
-                  <a:rPr lang="en-US" dirty="0"/>
-                  <a:t>Monte Carlo estimator based on using multiple sampling techniques and combining their results using a weighting function.</a:t>
-                </a:r>
-              </a:p>
-              <a:p>
-                <a:r>
-                  <a:rPr lang="en-US" dirty="0"/>
-                  <a:t>Balance Heuristic:</a:t>
-                </a:r>
-              </a:p>
-              <a:p>
-                <a:pPr lvl="1"/>
-                <a:r>
-                  <a:rPr lang="en-US" dirty="0"/>
-                  <a:t>A provably good weighting function</a:t>
-                </a:r>
-              </a:p>
-              <a:p>
-                <a:pPr lvl="1"/>
-                <a14:m>
-                  <m:oMath xmlns:m="http://schemas.openxmlformats.org/officeDocument/2006/math">
-                    <m:acc>
-                      <m:accPr>
-                        <m:chr m:val="̂"/>
-                        <m:ctrlPr>
-                          <a:rPr lang="en-US" i="1" smtClean="0">
-                            <a:latin typeface="Cambria Math" panose="02040503050406030204" pitchFamily="18" charset="0"/>
-                          </a:rPr>
-                        </m:ctrlPr>
-                      </m:accPr>
-                      <m:e>
-                        <m:r>
-                          <a:rPr lang="en-US" b="0" i="1" smtClean="0">
-                            <a:latin typeface="Cambria Math" panose="02040503050406030204" pitchFamily="18" charset="0"/>
-                          </a:rPr>
-                          <m:t>𝑤</m:t>
-                        </m:r>
-                      </m:e>
-                    </m:acc>
-                    <m:d>
-                      <m:dPr>
-                        <m:ctrlPr>
-                          <a:rPr lang="en-US" b="0" i="1" smtClean="0">
-                            <a:latin typeface="Cambria Math" panose="02040503050406030204" pitchFamily="18" charset="0"/>
-                          </a:rPr>
-                        </m:ctrlPr>
-                      </m:dPr>
-                      <m:e>
-                        <m:r>
-                          <a:rPr lang="en-US" b="0" i="1" smtClean="0">
-                            <a:latin typeface="Cambria Math" panose="02040503050406030204" pitchFamily="18" charset="0"/>
-                          </a:rPr>
-                          <m:t>𝑥</m:t>
-                        </m:r>
-                      </m:e>
-                    </m:d>
-                    <m:r>
-                      <a:rPr lang="en-US" b="0" i="1" smtClean="0">
-                        <a:latin typeface="Cambria Math" panose="02040503050406030204" pitchFamily="18" charset="0"/>
-                      </a:rPr>
-                      <m:t>=</m:t>
-                    </m:r>
-                    <m:f>
-                      <m:fPr>
-                        <m:ctrlPr>
-                          <a:rPr lang="en-US" b="0" i="1" smtClean="0">
-                            <a:latin typeface="Cambria Math" panose="02040503050406030204" pitchFamily="18" charset="0"/>
-                          </a:rPr>
-                        </m:ctrlPr>
-                      </m:fPr>
-                      <m:num>
-                        <m:sSub>
-                          <m:sSubPr>
-                            <m:ctrlPr>
-                              <a:rPr lang="en-US" b="0" i="1" smtClean="0">
-                                <a:latin typeface="Cambria Math" panose="02040503050406030204" pitchFamily="18" charset="0"/>
-                              </a:rPr>
-                            </m:ctrlPr>
-                          </m:sSubPr>
-                          <m:e>
-                            <m:r>
-                              <a:rPr lang="en-US" b="0" i="1" smtClean="0">
-                                <a:latin typeface="Cambria Math" panose="02040503050406030204" pitchFamily="18" charset="0"/>
-                              </a:rPr>
-                              <m:t>𝑛</m:t>
-                            </m:r>
-                          </m:e>
-                          <m:sub>
-                            <m:r>
-                              <a:rPr lang="en-US" b="0" i="1" smtClean="0">
-                                <a:latin typeface="Cambria Math" panose="02040503050406030204" pitchFamily="18" charset="0"/>
-                              </a:rPr>
-                              <m:t>𝑖</m:t>
-                            </m:r>
-                          </m:sub>
-                        </m:sSub>
-                        <m:sSub>
-                          <m:sSubPr>
-                            <m:ctrlPr>
-                              <a:rPr lang="en-US" b="0" i="1" smtClean="0">
-                                <a:latin typeface="Cambria Math" panose="02040503050406030204" pitchFamily="18" charset="0"/>
-                              </a:rPr>
-                            </m:ctrlPr>
-                          </m:sSubPr>
-                          <m:e>
-                            <m:r>
-                              <a:rPr lang="en-US" b="0" i="1" smtClean="0">
-                                <a:latin typeface="Cambria Math" panose="02040503050406030204" pitchFamily="18" charset="0"/>
-                              </a:rPr>
-                              <m:t>𝑝</m:t>
-                            </m:r>
-                          </m:e>
-                          <m:sub>
-                            <m:r>
-                              <a:rPr lang="en-US" b="0" i="1" smtClean="0">
-                                <a:latin typeface="Cambria Math" panose="02040503050406030204" pitchFamily="18" charset="0"/>
-                              </a:rPr>
-                              <m:t>𝑖</m:t>
-                            </m:r>
-                          </m:sub>
-                        </m:sSub>
-                        <m:r>
-                          <a:rPr lang="en-US" b="0" i="1" smtClean="0">
-                            <a:latin typeface="Cambria Math" panose="02040503050406030204" pitchFamily="18" charset="0"/>
-                          </a:rPr>
-                          <m:t>(</m:t>
-                        </m:r>
-                        <m:r>
-                          <a:rPr lang="en-US" b="0" i="1" smtClean="0">
-                            <a:latin typeface="Cambria Math" panose="02040503050406030204" pitchFamily="18" charset="0"/>
-                          </a:rPr>
-                          <m:t>𝑥</m:t>
-                        </m:r>
-                        <m:r>
-                          <a:rPr lang="en-US" b="0" i="1" smtClean="0">
-                            <a:latin typeface="Cambria Math" panose="02040503050406030204" pitchFamily="18" charset="0"/>
-                          </a:rPr>
-                          <m:t>)</m:t>
-                        </m:r>
-                      </m:num>
-                      <m:den>
-                        <m:nary>
-                          <m:naryPr>
-                            <m:chr m:val="∑"/>
-                            <m:limLoc m:val="subSup"/>
-                            <m:supHide m:val="on"/>
-                            <m:ctrlPr>
-                              <a:rPr lang="en-US" b="0" i="1" smtClean="0">
-                                <a:latin typeface="Cambria Math" panose="02040503050406030204" pitchFamily="18" charset="0"/>
-                              </a:rPr>
-                            </m:ctrlPr>
-                          </m:naryPr>
-                          <m:sub>
-                            <m:r>
-                              <m:rPr>
-                                <m:brk m:alnAt="9"/>
-                              </m:rPr>
-                              <a:rPr lang="en-US" b="0" i="1" smtClean="0">
-                                <a:latin typeface="Cambria Math" panose="02040503050406030204" pitchFamily="18" charset="0"/>
-                              </a:rPr>
-                              <m:t>𝑘</m:t>
-                            </m:r>
-                          </m:sub>
-                          <m:sup/>
-                          <m:e>
-                            <m:sSub>
-                              <m:sSubPr>
-                                <m:ctrlPr>
-                                  <a:rPr lang="en-US" i="1">
-                                    <a:latin typeface="Cambria Math" panose="02040503050406030204" pitchFamily="18" charset="0"/>
-                                  </a:rPr>
-                                </m:ctrlPr>
-                              </m:sSubPr>
-                              <m:e>
-                                <m:r>
-                                  <a:rPr lang="en-US" i="1">
-                                    <a:latin typeface="Cambria Math" panose="02040503050406030204" pitchFamily="18" charset="0"/>
-                                  </a:rPr>
-                                  <m:t>𝑛</m:t>
-                                </m:r>
-                              </m:e>
-                              <m:sub>
-                                <m:r>
-                                  <a:rPr lang="en-US" b="0" i="1" smtClean="0">
-                                    <a:latin typeface="Cambria Math" panose="02040503050406030204" pitchFamily="18" charset="0"/>
-                                  </a:rPr>
-                                  <m:t>𝑘</m:t>
-                                </m:r>
-                              </m:sub>
-                            </m:sSub>
-                            <m:sSub>
-                              <m:sSubPr>
-                                <m:ctrlPr>
-                                  <a:rPr lang="en-US" i="1">
-                                    <a:latin typeface="Cambria Math" panose="02040503050406030204" pitchFamily="18" charset="0"/>
-                                  </a:rPr>
-                                </m:ctrlPr>
-                              </m:sSubPr>
-                              <m:e>
-                                <m:r>
-                                  <a:rPr lang="en-US" i="1">
-                                    <a:latin typeface="Cambria Math" panose="02040503050406030204" pitchFamily="18" charset="0"/>
-                                  </a:rPr>
-                                  <m:t>𝑝</m:t>
-                                </m:r>
-                              </m:e>
-                              <m:sub>
-                                <m:r>
-                                  <a:rPr lang="en-US" b="0" i="1" smtClean="0">
-                                    <a:latin typeface="Cambria Math" panose="02040503050406030204" pitchFamily="18" charset="0"/>
-                                  </a:rPr>
-                                  <m:t>𝑘</m:t>
-                                </m:r>
-                              </m:sub>
-                            </m:sSub>
-                            <m:r>
-                              <a:rPr lang="en-US" i="1">
-                                <a:latin typeface="Cambria Math" panose="02040503050406030204" pitchFamily="18" charset="0"/>
-                              </a:rPr>
-                              <m:t>(</m:t>
-                            </m:r>
-                            <m:r>
-                              <a:rPr lang="en-US" i="1">
-                                <a:latin typeface="Cambria Math" panose="02040503050406030204" pitchFamily="18" charset="0"/>
-                              </a:rPr>
-                              <m:t>𝑥</m:t>
-                            </m:r>
-                            <m:r>
-                              <a:rPr lang="en-US" i="1">
-                                <a:latin typeface="Cambria Math" panose="02040503050406030204" pitchFamily="18" charset="0"/>
-                              </a:rPr>
-                              <m:t>)</m:t>
-                            </m:r>
-                          </m:e>
-                        </m:nary>
-                      </m:den>
-                    </m:f>
-                  </m:oMath>
-                </a14:m>
-                <a:endParaRPr lang="en-US" dirty="0"/>
-              </a:p>
-              <a:p>
-                <a:r>
-                  <a:rPr lang="en-US" dirty="0"/>
-                  <a:t>For a measurement </a:t>
-                </a:r>
-                <a:r>
-                  <a:rPr lang="en-US" dirty="0" err="1"/>
-                  <a:t>I</a:t>
-                </a:r>
-                <a:r>
-                  <a:rPr lang="en-US" baseline="-25000" dirty="0" err="1"/>
-                  <a:t>j</a:t>
-                </a:r>
-                <a:r>
-                  <a:rPr lang="en-US" dirty="0"/>
-                  <a:t> over the space of paths </a:t>
-                </a:r>
-                <a:r>
-                  <a:rPr lang="el-GR" dirty="0"/>
-                  <a:t>Ω</a:t>
-                </a:r>
-                <a:r>
-                  <a:rPr lang="en-US" dirty="0"/>
-                  <a:t>:</a:t>
-                </a:r>
-              </a:p>
-              <a:p>
-                <a:pPr lvl="1"/>
-                <a14:m>
-                  <m:oMath xmlns:m="http://schemas.openxmlformats.org/officeDocument/2006/math">
-                    <m:r>
-                      <a:rPr lang="en-US" b="0" i="1" smtClean="0">
-                        <a:latin typeface="Cambria Math" panose="02040503050406030204" pitchFamily="18" charset="0"/>
-                      </a:rPr>
-                      <m:t>𝐹</m:t>
-                    </m:r>
-                    <m:r>
-                      <a:rPr lang="en-US" b="0" i="1" smtClean="0">
-                        <a:latin typeface="Cambria Math" panose="02040503050406030204" pitchFamily="18" charset="0"/>
-                      </a:rPr>
-                      <m:t>= </m:t>
-                    </m:r>
-                    <m:nary>
-                      <m:naryPr>
-                        <m:chr m:val="∑"/>
-                        <m:supHide m:val="on"/>
-                        <m:ctrlPr>
-                          <a:rPr lang="en-US" b="0" i="1" smtClean="0">
-                            <a:latin typeface="Cambria Math" panose="02040503050406030204" pitchFamily="18" charset="0"/>
-                          </a:rPr>
-                        </m:ctrlPr>
-                      </m:naryPr>
-                      <m:sub>
-                        <m:r>
-                          <m:rPr>
-                            <m:brk m:alnAt="7"/>
-                          </m:rPr>
-                          <a:rPr lang="en-US" b="0" i="1" smtClean="0">
-                            <a:latin typeface="Cambria Math" panose="02040503050406030204" pitchFamily="18" charset="0"/>
-                          </a:rPr>
-                          <m:t>𝑠</m:t>
-                        </m:r>
-                        <m:r>
-                          <a:rPr lang="en-US" b="0" i="1" smtClean="0">
-                            <a:latin typeface="Cambria Math" panose="02040503050406030204" pitchFamily="18" charset="0"/>
-                            <a:ea typeface="Cambria Math" panose="02040503050406030204" pitchFamily="18" charset="0"/>
-                          </a:rPr>
-                          <m:t>≥0</m:t>
-                        </m:r>
-                      </m:sub>
-                      <m:sup/>
-                      <m:e>
-                        <m:nary>
-                          <m:naryPr>
-                            <m:chr m:val="∑"/>
-                            <m:supHide m:val="on"/>
-                            <m:ctrlPr>
-                              <a:rPr lang="en-US" b="0" i="1" smtClean="0">
-                                <a:latin typeface="Cambria Math" panose="02040503050406030204" pitchFamily="18" charset="0"/>
-                              </a:rPr>
-                            </m:ctrlPr>
-                          </m:naryPr>
-                          <m:sub>
-                            <m:r>
-                              <m:rPr>
-                                <m:brk m:alnAt="7"/>
-                              </m:rPr>
-                              <a:rPr lang="en-US" b="0" i="1" smtClean="0">
-                                <a:latin typeface="Cambria Math" panose="02040503050406030204" pitchFamily="18" charset="0"/>
-                              </a:rPr>
-                              <m:t>𝑡</m:t>
-                            </m:r>
-                            <m:r>
-                              <a:rPr lang="en-US" b="0" i="1" smtClean="0">
-                                <a:latin typeface="Cambria Math" panose="02040503050406030204" pitchFamily="18" charset="0"/>
-                                <a:ea typeface="Cambria Math" panose="02040503050406030204" pitchFamily="18" charset="0"/>
-                              </a:rPr>
-                              <m:t>≥0</m:t>
-                            </m:r>
-                          </m:sub>
-                          <m:sup/>
-                          <m:e>
-                            <m:sSub>
-                              <m:sSubPr>
-                                <m:ctrlPr>
-                                  <a:rPr lang="en-US" b="0" i="1" smtClean="0">
-                                    <a:latin typeface="Cambria Math" panose="02040503050406030204" pitchFamily="18" charset="0"/>
-                                  </a:rPr>
-                                </m:ctrlPr>
-                              </m:sSubPr>
-                              <m:e>
-                                <m:r>
-                                  <a:rPr lang="en-US" b="0" i="1" smtClean="0">
-                                    <a:latin typeface="Cambria Math" panose="02040503050406030204" pitchFamily="18" charset="0"/>
-                                  </a:rPr>
-                                  <m:t>𝑤</m:t>
-                                </m:r>
-                              </m:e>
-                              <m:sub>
-                                <m:r>
-                                  <a:rPr lang="en-US" b="0" i="1" smtClean="0">
-                                    <a:latin typeface="Cambria Math" panose="02040503050406030204" pitchFamily="18" charset="0"/>
-                                  </a:rPr>
-                                  <m:t>𝑠</m:t>
-                                </m:r>
-                                <m:r>
-                                  <a:rPr lang="en-US" b="0" i="1" smtClean="0">
-                                    <a:latin typeface="Cambria Math" panose="02040503050406030204" pitchFamily="18" charset="0"/>
-                                  </a:rPr>
-                                  <m:t>,</m:t>
-                                </m:r>
-                                <m:r>
-                                  <a:rPr lang="en-US" b="0" i="1" smtClean="0">
-                                    <a:latin typeface="Cambria Math" panose="02040503050406030204" pitchFamily="18" charset="0"/>
-                                  </a:rPr>
-                                  <m:t>𝑡</m:t>
-                                </m:r>
-                              </m:sub>
-                            </m:sSub>
-                            <m:r>
-                              <a:rPr lang="en-US" b="0" i="1" smtClean="0">
-                                <a:latin typeface="Cambria Math" panose="02040503050406030204" pitchFamily="18" charset="0"/>
-                              </a:rPr>
-                              <m:t>(</m:t>
-                            </m:r>
-                            <m:sSub>
-                              <m:sSubPr>
-                                <m:ctrlPr>
-                                  <a:rPr lang="en-US" b="0" i="1" smtClean="0">
-                                    <a:latin typeface="Cambria Math" panose="02040503050406030204" pitchFamily="18" charset="0"/>
-                                  </a:rPr>
-                                </m:ctrlPr>
-                              </m:sSubPr>
-                              <m:e>
-                                <m:bar>
-                                  <m:barPr>
-                                    <m:pos m:val="top"/>
-                                    <m:ctrlPr>
-                                      <a:rPr lang="en-US" b="0" i="1" smtClean="0">
-                                        <a:latin typeface="Cambria Math" panose="02040503050406030204" pitchFamily="18" charset="0"/>
-                                      </a:rPr>
-                                    </m:ctrlPr>
-                                  </m:barPr>
-                                  <m:e>
-                                    <m:r>
-                                      <a:rPr lang="en-US" b="0" i="1" smtClean="0">
-                                        <a:latin typeface="Cambria Math" panose="02040503050406030204" pitchFamily="18" charset="0"/>
-                                      </a:rPr>
-                                      <m:t>𝑥</m:t>
-                                    </m:r>
-                                  </m:e>
-                                </m:bar>
-                              </m:e>
-                              <m:sub>
-                                <m:r>
-                                  <a:rPr lang="en-US" b="0" i="1" smtClean="0">
-                                    <a:latin typeface="Cambria Math" panose="02040503050406030204" pitchFamily="18" charset="0"/>
-                                  </a:rPr>
-                                  <m:t>𝑠</m:t>
-                                </m:r>
-                                <m:r>
-                                  <a:rPr lang="en-US" b="0" i="1" smtClean="0">
-                                    <a:latin typeface="Cambria Math" panose="02040503050406030204" pitchFamily="18" charset="0"/>
-                                  </a:rPr>
-                                  <m:t>,</m:t>
-                                </m:r>
-                                <m:r>
-                                  <a:rPr lang="en-US" b="0" i="1" smtClean="0">
-                                    <a:latin typeface="Cambria Math" panose="02040503050406030204" pitchFamily="18" charset="0"/>
-                                  </a:rPr>
-                                  <m:t>𝑡</m:t>
-                                </m:r>
-                              </m:sub>
-                            </m:sSub>
-                            <m:r>
-                              <a:rPr lang="en-US" b="0" i="1" smtClean="0">
-                                <a:latin typeface="Cambria Math" panose="02040503050406030204" pitchFamily="18" charset="0"/>
-                              </a:rPr>
-                              <m:t>)</m:t>
-                            </m:r>
-                            <m:f>
-                              <m:fPr>
-                                <m:ctrlPr>
-                                  <a:rPr lang="en-US" b="0" i="1" smtClean="0">
-                                    <a:latin typeface="Cambria Math" panose="02040503050406030204" pitchFamily="18" charset="0"/>
-                                  </a:rPr>
-                                </m:ctrlPr>
-                              </m:fPr>
-                              <m:num>
-                                <m:sSub>
-                                  <m:sSubPr>
-                                    <m:ctrlPr>
-                                      <a:rPr lang="en-US" b="0" i="1" smtClean="0">
-                                        <a:latin typeface="Cambria Math" panose="02040503050406030204" pitchFamily="18" charset="0"/>
-                                      </a:rPr>
-                                    </m:ctrlPr>
-                                  </m:sSubPr>
-                                  <m:e>
-                                    <m:r>
-                                      <a:rPr lang="en-US" b="0" i="1" smtClean="0">
-                                        <a:latin typeface="Cambria Math" panose="02040503050406030204" pitchFamily="18" charset="0"/>
-                                      </a:rPr>
-                                      <m:t>𝑓</m:t>
-                                    </m:r>
-                                  </m:e>
-                                  <m:sub>
-                                    <m:r>
-                                      <a:rPr lang="en-US" b="0" i="1" smtClean="0">
-                                        <a:latin typeface="Cambria Math" panose="02040503050406030204" pitchFamily="18" charset="0"/>
-                                      </a:rPr>
-                                      <m:t>𝑗</m:t>
-                                    </m:r>
-                                  </m:sub>
-                                </m:sSub>
-                                <m:r>
-                                  <a:rPr lang="en-US" i="1">
-                                    <a:latin typeface="Cambria Math" panose="02040503050406030204" pitchFamily="18" charset="0"/>
-                                  </a:rPr>
-                                  <m:t>(</m:t>
-                                </m:r>
-                                <m:sSub>
-                                  <m:sSubPr>
-                                    <m:ctrlPr>
-                                      <a:rPr lang="en-US" i="1">
-                                        <a:latin typeface="Cambria Math" panose="02040503050406030204" pitchFamily="18" charset="0"/>
-                                      </a:rPr>
-                                    </m:ctrlPr>
-                                  </m:sSubPr>
-                                  <m:e>
-                                    <m:bar>
-                                      <m:barPr>
-                                        <m:pos m:val="top"/>
-                                        <m:ctrlPr>
-                                          <a:rPr lang="en-US" i="1">
-                                            <a:latin typeface="Cambria Math" panose="02040503050406030204" pitchFamily="18" charset="0"/>
-                                          </a:rPr>
-                                        </m:ctrlPr>
-                                      </m:barPr>
-                                      <m:e>
-                                        <m:r>
-                                          <a:rPr lang="en-US" i="1">
-                                            <a:latin typeface="Cambria Math" panose="02040503050406030204" pitchFamily="18" charset="0"/>
-                                          </a:rPr>
-                                          <m:t>𝑥</m:t>
-                                        </m:r>
-                                      </m:e>
-                                    </m:bar>
-                                  </m:e>
-                                  <m:sub>
-                                    <m:r>
-                                      <a:rPr lang="en-US" i="1">
-                                        <a:latin typeface="Cambria Math" panose="02040503050406030204" pitchFamily="18" charset="0"/>
-                                      </a:rPr>
-                                      <m:t>𝑠</m:t>
-                                    </m:r>
-                                    <m:r>
-                                      <a:rPr lang="en-US" i="1">
-                                        <a:latin typeface="Cambria Math" panose="02040503050406030204" pitchFamily="18" charset="0"/>
-                                      </a:rPr>
-                                      <m:t>,</m:t>
-                                    </m:r>
-                                    <m:r>
-                                      <a:rPr lang="en-US" i="1">
-                                        <a:latin typeface="Cambria Math" panose="02040503050406030204" pitchFamily="18" charset="0"/>
-                                      </a:rPr>
-                                      <m:t>𝑡</m:t>
-                                    </m:r>
-                                  </m:sub>
-                                </m:sSub>
-                                <m:r>
-                                  <a:rPr lang="en-US" i="1">
-                                    <a:latin typeface="Cambria Math" panose="02040503050406030204" pitchFamily="18" charset="0"/>
-                                  </a:rPr>
-                                  <m:t>)</m:t>
-                                </m:r>
-                              </m:num>
-                              <m:den>
-                                <m:sSub>
-                                  <m:sSubPr>
-                                    <m:ctrlPr>
-                                      <a:rPr lang="en-US" b="0" i="1" smtClean="0">
-                                        <a:latin typeface="Cambria Math" panose="02040503050406030204" pitchFamily="18" charset="0"/>
-                                      </a:rPr>
-                                    </m:ctrlPr>
-                                  </m:sSubPr>
-                                  <m:e>
-                                    <m:r>
-                                      <a:rPr lang="en-US" b="0" i="1" smtClean="0">
-                                        <a:latin typeface="Cambria Math" panose="02040503050406030204" pitchFamily="18" charset="0"/>
-                                      </a:rPr>
-                                      <m:t>𝑝</m:t>
-                                    </m:r>
-                                  </m:e>
-                                  <m:sub>
-                                    <m:r>
-                                      <a:rPr lang="en-US" b="0" i="1" smtClean="0">
-                                        <a:latin typeface="Cambria Math" panose="02040503050406030204" pitchFamily="18" charset="0"/>
-                                      </a:rPr>
-                                      <m:t>𝑠</m:t>
-                                    </m:r>
-                                    <m:r>
-                                      <a:rPr lang="en-US" b="0" i="1" smtClean="0">
-                                        <a:latin typeface="Cambria Math" panose="02040503050406030204" pitchFamily="18" charset="0"/>
-                                      </a:rPr>
-                                      <m:t>,</m:t>
-                                    </m:r>
-                                    <m:r>
-                                      <a:rPr lang="en-US" b="0" i="1" smtClean="0">
-                                        <a:latin typeface="Cambria Math" panose="02040503050406030204" pitchFamily="18" charset="0"/>
-                                      </a:rPr>
-                                      <m:t>𝑡</m:t>
-                                    </m:r>
-                                  </m:sub>
-                                </m:sSub>
-                                <m:r>
-                                  <a:rPr lang="en-US" i="1">
-                                    <a:latin typeface="Cambria Math" panose="02040503050406030204" pitchFamily="18" charset="0"/>
-                                  </a:rPr>
-                                  <m:t>(</m:t>
-                                </m:r>
-                                <m:sSub>
-                                  <m:sSubPr>
-                                    <m:ctrlPr>
-                                      <a:rPr lang="en-US" i="1">
-                                        <a:latin typeface="Cambria Math" panose="02040503050406030204" pitchFamily="18" charset="0"/>
-                                      </a:rPr>
-                                    </m:ctrlPr>
-                                  </m:sSubPr>
-                                  <m:e>
-                                    <m:bar>
-                                      <m:barPr>
-                                        <m:pos m:val="top"/>
-                                        <m:ctrlPr>
-                                          <a:rPr lang="en-US" i="1">
-                                            <a:latin typeface="Cambria Math" panose="02040503050406030204" pitchFamily="18" charset="0"/>
-                                          </a:rPr>
-                                        </m:ctrlPr>
-                                      </m:barPr>
-                                      <m:e>
-                                        <m:r>
-                                          <a:rPr lang="en-US" i="1">
-                                            <a:latin typeface="Cambria Math" panose="02040503050406030204" pitchFamily="18" charset="0"/>
-                                          </a:rPr>
-                                          <m:t>𝑥</m:t>
-                                        </m:r>
-                                      </m:e>
-                                    </m:bar>
-                                  </m:e>
-                                  <m:sub>
-                                    <m:r>
-                                      <a:rPr lang="en-US" i="1">
-                                        <a:latin typeface="Cambria Math" panose="02040503050406030204" pitchFamily="18" charset="0"/>
-                                      </a:rPr>
-                                      <m:t>𝑠</m:t>
-                                    </m:r>
-                                    <m:r>
-                                      <a:rPr lang="en-US" i="1">
-                                        <a:latin typeface="Cambria Math" panose="02040503050406030204" pitchFamily="18" charset="0"/>
-                                      </a:rPr>
-                                      <m:t>,</m:t>
-                                    </m:r>
-                                    <m:r>
-                                      <a:rPr lang="en-US" i="1">
-                                        <a:latin typeface="Cambria Math" panose="02040503050406030204" pitchFamily="18" charset="0"/>
-                                      </a:rPr>
-                                      <m:t>𝑡</m:t>
-                                    </m:r>
-                                  </m:sub>
-                                </m:sSub>
-                                <m:r>
-                                  <a:rPr lang="en-US" i="1">
-                                    <a:latin typeface="Cambria Math" panose="02040503050406030204" pitchFamily="18" charset="0"/>
-                                  </a:rPr>
-                                  <m:t>)</m:t>
-                                </m:r>
-                              </m:den>
-                            </m:f>
-                          </m:e>
-                        </m:nary>
-                      </m:e>
-                    </m:nary>
-                  </m:oMath>
-                </a14:m>
-                <a:r>
-                  <a:rPr lang="en-US" dirty="0"/>
-                  <a:t> where </a:t>
-                </a:r>
-                <a:r>
-                  <a:rPr lang="en-US" dirty="0" err="1"/>
-                  <a:t>s,t</a:t>
-                </a:r>
-                <a:r>
-                  <a:rPr lang="en-US" dirty="0"/>
-                  <a:t> are the lengths of the light and eye </a:t>
-                </a:r>
-                <a:r>
-                  <a:rPr lang="en-US" dirty="0" err="1"/>
-                  <a:t>subpaths</a:t>
-                </a:r>
-                <a:r>
-                  <a:rPr lang="en-US" dirty="0"/>
-                  <a:t> and </a:t>
-                </a:r>
-                <a:r>
-                  <a:rPr lang="en-US" dirty="0" err="1"/>
-                  <a:t>w</a:t>
-                </a:r>
-                <a:r>
-                  <a:rPr lang="en-US" baseline="-25000" dirty="0" err="1"/>
-                  <a:t>s,t</a:t>
-                </a:r>
-                <a:r>
-                  <a:rPr lang="en-US" dirty="0"/>
-                  <a:t> are given by the balance heuristic.</a:t>
-                </a:r>
-              </a:p>
-            </p:txBody>
-          </p:sp>
-        </mc:Choice>
-        <mc:Fallback>
-          <p:sp>
-            <p:nvSpPr>
-              <p:cNvPr id="5" name="Content Placeholder 4"/>
-              <p:cNvSpPr>
-                <a:spLocks noGrp="1" noRot="1" noChangeAspect="1" noMove="1" noResize="1" noEditPoints="1" noAdjustHandles="1" noChangeArrowheads="1" noChangeShapeType="1" noTextEdit="1"/>
-              </p:cNvSpPr>
-              <p:nvPr>
-                <p:ph idx="1"/>
-              </p:nvPr>
-            </p:nvSpPr>
-            <p:spPr>
-              <a:blipFill>
-                <a:blip r:embed="rId2"/>
-                <a:stretch>
-                  <a:fillRect l="-341" t="-872" r="-749"/>
-                </a:stretch>
-              </a:blipFill>
-            </p:spPr>
-            <p:txBody>
-              <a:bodyPr/>
-              <a:lstStyle/>
-              <a:p>
-                <a:r>
-                  <a:rPr lang="en-US">
-                    <a:noFill/>
-                  </a:rPr>
-                  <a:t> </a:t>
-                </a:r>
-              </a:p>
-            </p:txBody>
-          </p:sp>
-        </mc:Fallback>
-      </mc:AlternateContent>
+      <p:sp>
+        <p:nvSpPr>
+          <p:cNvPr id="5" name="Content Placeholder 4"/>
+          <p:cNvSpPr>
+            <a:spLocks noGrp="1"/>
+          </p:cNvSpPr>
+          <p:nvPr>
+            <p:ph idx="1"/>
+          </p:nvPr>
+        </p:nvSpPr>
+        <p:spPr/>
+        <p:txBody>
+          <a:bodyPr/>
+          <a:lstStyle/>
+          <a:p>
+            <a:r>
+              <a:rPr lang="en-US" dirty="0"/>
+              <a:t>Monte Carlo estimator based on using multiple sampling techniques and combining their results using a weighting function.</a:t>
+            </a:r>
+          </a:p>
+          <a:p>
+            <a:r>
+              <a:rPr lang="en-US" dirty="0"/>
+              <a:t>Balance Heuristic:</a:t>
+            </a:r>
+          </a:p>
+          <a:p>
+            <a:pPr marL="457200" lvl="1" indent="0">
+              <a:buNone/>
+            </a:pPr>
+            <a:endParaRPr lang="en-US" b="0" dirty="0"/>
+          </a:p>
+          <a:p>
+            <a:pPr marL="457200" lvl="1" indent="0">
+              <a:buNone/>
+            </a:pPr>
+            <a:endParaRPr lang="en-US" dirty="0"/>
+          </a:p>
+          <a:p>
+            <a:r>
+              <a:rPr lang="en-US" dirty="0"/>
+              <a:t>For a measurement </a:t>
+            </a:r>
+            <a:r>
+              <a:rPr lang="en-US" dirty="0" err="1"/>
+              <a:t>I</a:t>
+            </a:r>
+            <a:r>
+              <a:rPr lang="en-US" baseline="-25000" dirty="0" err="1"/>
+              <a:t>j</a:t>
+            </a:r>
+            <a:r>
+              <a:rPr lang="en-US" dirty="0"/>
+              <a:t> over the space of paths </a:t>
+            </a:r>
+            <a:r>
+              <a:rPr lang="el-GR" dirty="0"/>
+              <a:t>Ω</a:t>
+            </a:r>
+            <a:r>
+              <a:rPr lang="en-US" dirty="0"/>
+              <a:t>:</a:t>
+            </a:r>
+          </a:p>
+          <a:p>
+            <a:pPr lvl="1"/>
+            <a:endParaRPr lang="en-US" dirty="0"/>
+          </a:p>
+          <a:p>
+            <a:pPr lvl="1"/>
+            <a:endParaRPr lang="en-US" dirty="0"/>
+          </a:p>
+          <a:p>
+            <a:pPr lvl="1"/>
+            <a:r>
+              <a:rPr lang="en-US" dirty="0"/>
+              <a:t>where </a:t>
+            </a:r>
+            <a:r>
+              <a:rPr lang="en-US" dirty="0" err="1"/>
+              <a:t>s,t</a:t>
+            </a:r>
+            <a:r>
+              <a:rPr lang="en-US" dirty="0"/>
+              <a:t> are the lengths of the light and eye </a:t>
+            </a:r>
+            <a:r>
+              <a:rPr lang="en-US" dirty="0" err="1"/>
+              <a:t>subpaths</a:t>
+            </a:r>
+            <a:r>
+              <a:rPr lang="en-US" dirty="0"/>
+              <a:t> and </a:t>
+            </a:r>
+            <a:r>
+              <a:rPr lang="en-US" dirty="0" err="1"/>
+              <a:t>w</a:t>
+            </a:r>
+            <a:r>
+              <a:rPr lang="en-US" baseline="-25000" dirty="0" err="1"/>
+              <a:t>s,t</a:t>
+            </a:r>
+            <a:r>
+              <a:rPr lang="en-US" dirty="0"/>
+              <a:t> are given by the balance heuristic.</a:t>
+            </a:r>
+          </a:p>
+        </p:txBody>
+      </p:sp>
+      <p:pic>
+        <p:nvPicPr>
+          <p:cNvPr id="4" name="Picture 3"/>
+          <p:cNvPicPr>
+            <a:picLocks noChangeAspect="1"/>
+          </p:cNvPicPr>
+          <p:nvPr/>
+        </p:nvPicPr>
+        <p:blipFill>
+          <a:blip r:embed="rId2"/>
+          <a:stretch>
+            <a:fillRect/>
+          </a:stretch>
+        </p:blipFill>
+        <p:spPr>
+          <a:xfrm>
+            <a:off x="3938268" y="3265633"/>
+            <a:ext cx="2067213" cy="628738"/>
+          </a:xfrm>
+          <a:prstGeom prst="rect">
+            <a:avLst/>
+          </a:prstGeom>
+        </p:spPr>
+      </p:pic>
+      <p:pic>
+        <p:nvPicPr>
+          <p:cNvPr id="7" name="Picture 6"/>
+          <p:cNvPicPr>
+            <a:picLocks noChangeAspect="1"/>
+          </p:cNvPicPr>
+          <p:nvPr/>
+        </p:nvPicPr>
+        <p:blipFill>
+          <a:blip r:embed="rId3"/>
+          <a:stretch>
+            <a:fillRect/>
+          </a:stretch>
+        </p:blipFill>
+        <p:spPr>
+          <a:xfrm>
+            <a:off x="3161871" y="4515807"/>
+            <a:ext cx="3620005" cy="695422"/>
+          </a:xfrm>
+          <a:prstGeom prst="rect">
+            <a:avLst/>
+          </a:prstGeom>
+        </p:spPr>
+      </p:pic>
     </p:spTree>
     <p:extLst>
       <p:ext uri="{BB962C8B-B14F-4D97-AF65-F5344CB8AC3E}">
@@ -7367,8 +6797,8 @@
           </a:p>
         </p:txBody>
       </p:sp>
-      <mc:AlternateContent xmlns:mc="http://schemas.openxmlformats.org/markup-compatibility/2006">
-        <mc:Choice xmlns:a14="http://schemas.microsoft.com/office/drawing/2010/main" Requires="a14">
+      <mc:AlternateContent xmlns:mc="http://schemas.openxmlformats.org/markup-compatibility/2006" xmlns:a14="http://schemas.microsoft.com/office/drawing/2010/main">
+        <mc:Choice Requires="a14">
           <p:sp>
             <p:nvSpPr>
               <p:cNvPr id="3" name="Content Placeholder 2"/>
@@ -7551,7 +6981,7 @@
             </p:txBody>
           </p:sp>
         </mc:Choice>
-        <mc:Fallback>
+        <mc:Fallback xmlns="">
           <p:sp>
             <p:nvSpPr>
               <p:cNvPr id="3" name="Content Placeholder 2"/>

</xml_diff>